<commit_message>
Changes to Solutions + LaTeX
</commit_message>
<xml_diff>
--- a/tex/mscthesis/figure/Example/Pictures.ppt.pptx
+++ b/tex/mscthesis/figure/Example/Pictures.ppt.pptx
@@ -17,6 +17,7 @@
     <p:sldId id="260" r:id="rId11"/>
     <p:sldId id="261" r:id="rId12"/>
     <p:sldId id="264" r:id="rId13"/>
+    <p:sldId id="268" r:id="rId14"/>
   </p:sldIdLst>
   <p:sldSz cx="9144000" cy="6858000" type="screen4x3"/>
   <p:notesSz cx="6794500" cy="9931400"/>
@@ -300,7 +301,7 @@
             <a:fld id="{1D8BD707-D9CF-40AE-B4C6-C98DA3205C09}" type="datetimeFigureOut">
               <a:rPr lang="en-US" smtClean="0"/>
               <a:pPr/>
-              <a:t>2/9/2012</a:t>
+              <a:t>2/13/2012</a:t>
             </a:fld>
             <a:endParaRPr lang="en-US"/>
           </a:p>
@@ -467,7 +468,7 @@
             <a:fld id="{1D8BD707-D9CF-40AE-B4C6-C98DA3205C09}" type="datetimeFigureOut">
               <a:rPr lang="en-US" smtClean="0"/>
               <a:pPr/>
-              <a:t>2/9/2012</a:t>
+              <a:t>2/13/2012</a:t>
             </a:fld>
             <a:endParaRPr lang="en-US"/>
           </a:p>
@@ -644,7 +645,7 @@
             <a:fld id="{1D8BD707-D9CF-40AE-B4C6-C98DA3205C09}" type="datetimeFigureOut">
               <a:rPr lang="en-US" smtClean="0"/>
               <a:pPr/>
-              <a:t>2/9/2012</a:t>
+              <a:t>2/13/2012</a:t>
             </a:fld>
             <a:endParaRPr lang="en-US"/>
           </a:p>
@@ -811,7 +812,7 @@
             <a:fld id="{1D8BD707-D9CF-40AE-B4C6-C98DA3205C09}" type="datetimeFigureOut">
               <a:rPr lang="en-US" smtClean="0"/>
               <a:pPr/>
-              <a:t>2/9/2012</a:t>
+              <a:t>2/13/2012</a:t>
             </a:fld>
             <a:endParaRPr lang="en-US"/>
           </a:p>
@@ -1054,7 +1055,7 @@
             <a:fld id="{1D8BD707-D9CF-40AE-B4C6-C98DA3205C09}" type="datetimeFigureOut">
               <a:rPr lang="en-US" smtClean="0"/>
               <a:pPr/>
-              <a:t>2/9/2012</a:t>
+              <a:t>2/13/2012</a:t>
             </a:fld>
             <a:endParaRPr lang="en-US"/>
           </a:p>
@@ -1339,7 +1340,7 @@
             <a:fld id="{1D8BD707-D9CF-40AE-B4C6-C98DA3205C09}" type="datetimeFigureOut">
               <a:rPr lang="en-US" smtClean="0"/>
               <a:pPr/>
-              <a:t>2/9/2012</a:t>
+              <a:t>2/13/2012</a:t>
             </a:fld>
             <a:endParaRPr lang="en-US"/>
           </a:p>
@@ -1758,7 +1759,7 @@
             <a:fld id="{1D8BD707-D9CF-40AE-B4C6-C98DA3205C09}" type="datetimeFigureOut">
               <a:rPr lang="en-US" smtClean="0"/>
               <a:pPr/>
-              <a:t>2/9/2012</a:t>
+              <a:t>2/13/2012</a:t>
             </a:fld>
             <a:endParaRPr lang="en-US"/>
           </a:p>
@@ -1873,7 +1874,7 @@
             <a:fld id="{1D8BD707-D9CF-40AE-B4C6-C98DA3205C09}" type="datetimeFigureOut">
               <a:rPr lang="en-US" smtClean="0"/>
               <a:pPr/>
-              <a:t>2/9/2012</a:t>
+              <a:t>2/13/2012</a:t>
             </a:fld>
             <a:endParaRPr lang="en-US"/>
           </a:p>
@@ -1965,7 +1966,7 @@
             <a:fld id="{1D8BD707-D9CF-40AE-B4C6-C98DA3205C09}" type="datetimeFigureOut">
               <a:rPr lang="en-US" smtClean="0"/>
               <a:pPr/>
-              <a:t>2/9/2012</a:t>
+              <a:t>2/13/2012</a:t>
             </a:fld>
             <a:endParaRPr lang="en-US"/>
           </a:p>
@@ -2239,7 +2240,7 @@
             <a:fld id="{1D8BD707-D9CF-40AE-B4C6-C98DA3205C09}" type="datetimeFigureOut">
               <a:rPr lang="en-US" smtClean="0"/>
               <a:pPr/>
-              <a:t>2/9/2012</a:t>
+              <a:t>2/13/2012</a:t>
             </a:fld>
             <a:endParaRPr lang="en-US"/>
           </a:p>
@@ -2489,7 +2490,7 @@
             <a:fld id="{1D8BD707-D9CF-40AE-B4C6-C98DA3205C09}" type="datetimeFigureOut">
               <a:rPr lang="en-US" smtClean="0"/>
               <a:pPr/>
-              <a:t>2/9/2012</a:t>
+              <a:t>2/13/2012</a:t>
             </a:fld>
             <a:endParaRPr lang="en-US"/>
           </a:p>
@@ -2699,7 +2700,7 @@
             <a:fld id="{1D8BD707-D9CF-40AE-B4C6-C98DA3205C09}" type="datetimeFigureOut">
               <a:rPr lang="en-US" smtClean="0"/>
               <a:pPr/>
-              <a:t>2/9/2012</a:t>
+              <a:t>2/13/2012</a:t>
             </a:fld>
             <a:endParaRPr lang="en-US"/>
           </a:p>
@@ -5711,6 +5712,748 @@
 </p:sld>
 </file>
 
+<file path=ppt/slides/slide13.xml><?xml version="1.0" encoding="utf-8"?>
+<p:sld xmlns:a="http://schemas.openxmlformats.org/drawingml/2006/main" xmlns:r="http://schemas.openxmlformats.org/officeDocument/2006/relationships" xmlns:p="http://schemas.openxmlformats.org/presentationml/2006/main">
+  <p:cSld>
+    <p:spTree>
+      <p:nvGrpSpPr>
+        <p:cNvPr id="1" name=""/>
+        <p:cNvGrpSpPr/>
+        <p:nvPr/>
+      </p:nvGrpSpPr>
+      <p:grpSpPr>
+        <a:xfrm>
+          <a:off x="0" y="0"/>
+          <a:ext cx="0" cy="0"/>
+          <a:chOff x="0" y="0"/>
+          <a:chExt cx="0" cy="0"/>
+        </a:xfrm>
+      </p:grpSpPr>
+      <p:sp>
+        <p:nvSpPr>
+          <p:cNvPr id="3" name="Rectangle 2"/>
+          <p:cNvSpPr/>
+          <p:nvPr/>
+        </p:nvSpPr>
+        <p:spPr>
+          <a:xfrm>
+            <a:off x="-191476" y="685800"/>
+            <a:ext cx="10521315" cy="5734050"/>
+          </a:xfrm>
+          <a:prstGeom prst="rect">
+            <a:avLst/>
+          </a:prstGeom>
+          <a:ln w="19050"/>
+        </p:spPr>
+      </p:sp>
+      <p:grpSp>
+        <p:nvGrpSpPr>
+          <p:cNvPr id="30" name="Group 29"/>
+          <p:cNvGrpSpPr/>
+          <p:nvPr/>
+        </p:nvGrpSpPr>
+        <p:grpSpPr>
+          <a:xfrm>
+            <a:off x="488812" y="781050"/>
+            <a:ext cx="6877632" cy="2382792"/>
+            <a:chOff x="488812" y="781050"/>
+            <a:chExt cx="6877632" cy="2382792"/>
+          </a:xfrm>
+        </p:grpSpPr>
+        <p:sp>
+          <p:nvSpPr>
+            <p:cNvPr id="4" name="Text Box 4"/>
+            <p:cNvSpPr txBox="1"/>
+            <p:nvPr/>
+          </p:nvSpPr>
+          <p:spPr>
+            <a:xfrm>
+              <a:off x="2797399" y="781050"/>
+              <a:ext cx="2115185" cy="276225"/>
+            </a:xfrm>
+            <a:prstGeom prst="rect">
+              <a:avLst/>
+            </a:prstGeom>
+            <a:ln/>
+          </p:spPr>
+          <p:style>
+            <a:lnRef idx="1">
+              <a:schemeClr val="accent1"/>
+            </a:lnRef>
+            <a:fillRef idx="2">
+              <a:schemeClr val="accent1"/>
+            </a:fillRef>
+            <a:effectRef idx="1">
+              <a:schemeClr val="accent1"/>
+            </a:effectRef>
+            <a:fontRef idx="minor">
+              <a:schemeClr val="dk1"/>
+            </a:fontRef>
+          </p:style>
+          <p:txBody>
+            <a:bodyPr rot="0" spcFirstLastPara="0" vert="horz" wrap="none" lIns="91440" tIns="45720" rIns="91440" bIns="45720" numCol="1" spcCol="0" rtlCol="0" fromWordArt="0" anchor="t" anchorCtr="0" forceAA="0" compatLnSpc="1">
+              <a:prstTxWarp prst="textNoShape">
+                <a:avLst/>
+              </a:prstTxWarp>
+              <a:noAutofit/>
+            </a:bodyPr>
+            <a:lstStyle/>
+            <a:p>
+              <a:pPr>
+                <a:lnSpc>
+                  <a:spcPct val="115000"/>
+                </a:lnSpc>
+                <a:spcAft>
+                  <a:spcPts val="0"/>
+                </a:spcAft>
+              </a:pPr>
+              <a:r>
+                <a:rPr lang="en-NZ" sz="1200" dirty="0">
+                  <a:effectLst/>
+                  <a:latin typeface="Times New Roman"/>
+                  <a:ea typeface="SimSun"/>
+                  <a:cs typeface="Times New Roman"/>
+                </a:rPr>
+                <a:t>Referential Integrity </a:t>
+              </a:r>
+              <a:r>
+                <a:rPr lang="en-NZ" sz="1200" dirty="0" smtClean="0">
+                  <a:effectLst/>
+                  <a:latin typeface="Times New Roman"/>
+                  <a:ea typeface="SimSun"/>
+                  <a:cs typeface="Times New Roman"/>
+                </a:rPr>
+                <a:t>Constraint </a:t>
+              </a:r>
+              <a:endParaRPr lang="en-NZ" sz="1100" dirty="0">
+                <a:effectLst/>
+                <a:ea typeface="SimSun"/>
+                <a:cs typeface="Times New Roman"/>
+              </a:endParaRPr>
+            </a:p>
+          </p:txBody>
+        </p:sp>
+        <p:sp>
+          <p:nvSpPr>
+            <p:cNvPr id="5" name="Text Box 4"/>
+            <p:cNvSpPr txBox="1"/>
+            <p:nvPr/>
+          </p:nvSpPr>
+          <p:spPr>
+            <a:xfrm>
+              <a:off x="864824" y="1475400"/>
+              <a:ext cx="549275" cy="276225"/>
+            </a:xfrm>
+            <a:prstGeom prst="rect">
+              <a:avLst/>
+            </a:prstGeom>
+            <a:ln/>
+          </p:spPr>
+          <p:style>
+            <a:lnRef idx="1">
+              <a:schemeClr val="accent1"/>
+            </a:lnRef>
+            <a:fillRef idx="2">
+              <a:schemeClr val="accent1"/>
+            </a:fillRef>
+            <a:effectRef idx="1">
+              <a:schemeClr val="accent1"/>
+            </a:effectRef>
+            <a:fontRef idx="minor">
+              <a:schemeClr val="dk1"/>
+            </a:fontRef>
+          </p:style>
+          <p:txBody>
+            <a:bodyPr rot="0" spcFirstLastPara="0" vert="horz" wrap="none" lIns="91440" tIns="45720" rIns="91440" bIns="45720" numCol="1" spcCol="0" rtlCol="0" fromWordArt="0" anchor="t" anchorCtr="0" forceAA="0" compatLnSpc="1">
+              <a:prstTxWarp prst="textNoShape">
+                <a:avLst/>
+              </a:prstTxWarp>
+              <a:noAutofit/>
+            </a:bodyPr>
+            <a:lstStyle/>
+            <a:p>
+              <a:pPr>
+                <a:lnSpc>
+                  <a:spcPct val="115000"/>
+                </a:lnSpc>
+                <a:spcAft>
+                  <a:spcPts val="0"/>
+                </a:spcAft>
+              </a:pPr>
+              <a:r>
+                <a:rPr lang="en-NZ" sz="1200" b="1" dirty="0">
+                  <a:effectLst/>
+                  <a:latin typeface="Times New Roman"/>
+                  <a:ea typeface="SimSun"/>
+                </a:rPr>
+                <a:t>Insert</a:t>
+              </a:r>
+            </a:p>
+          </p:txBody>
+        </p:sp>
+        <p:sp>
+          <p:nvSpPr>
+            <p:cNvPr id="6" name="Text Box 4"/>
+            <p:cNvSpPr txBox="1"/>
+            <p:nvPr/>
+          </p:nvSpPr>
+          <p:spPr>
+            <a:xfrm>
+              <a:off x="6246449" y="1475400"/>
+              <a:ext cx="600075" cy="276225"/>
+            </a:xfrm>
+            <a:prstGeom prst="rect">
+              <a:avLst/>
+            </a:prstGeom>
+            <a:ln/>
+          </p:spPr>
+          <p:style>
+            <a:lnRef idx="1">
+              <a:schemeClr val="accent1"/>
+            </a:lnRef>
+            <a:fillRef idx="2">
+              <a:schemeClr val="accent1"/>
+            </a:fillRef>
+            <a:effectRef idx="1">
+              <a:schemeClr val="accent1"/>
+            </a:effectRef>
+            <a:fontRef idx="minor">
+              <a:schemeClr val="dk1"/>
+            </a:fontRef>
+          </p:style>
+          <p:txBody>
+            <a:bodyPr rot="0" spcFirstLastPara="0" vert="horz" wrap="none" lIns="91440" tIns="45720" rIns="91440" bIns="45720" numCol="1" spcCol="0" rtlCol="0" fromWordArt="0" anchor="t" anchorCtr="0" forceAA="0" compatLnSpc="1">
+              <a:prstTxWarp prst="textNoShape">
+                <a:avLst/>
+              </a:prstTxWarp>
+              <a:noAutofit/>
+            </a:bodyPr>
+            <a:lstStyle/>
+            <a:p>
+              <a:pPr>
+                <a:lnSpc>
+                  <a:spcPct val="115000"/>
+                </a:lnSpc>
+                <a:spcAft>
+                  <a:spcPts val="0"/>
+                </a:spcAft>
+              </a:pPr>
+              <a:r>
+                <a:rPr lang="en-NZ" sz="1200" b="1" dirty="0">
+                  <a:effectLst/>
+                  <a:latin typeface="Times New Roman"/>
+                  <a:ea typeface="SimSun"/>
+                </a:rPr>
+                <a:t>Delete</a:t>
+              </a:r>
+            </a:p>
+          </p:txBody>
+        </p:sp>
+        <p:sp>
+          <p:nvSpPr>
+            <p:cNvPr id="7" name="Text Box 4"/>
+            <p:cNvSpPr txBox="1"/>
+            <p:nvPr/>
+          </p:nvSpPr>
+          <p:spPr>
+            <a:xfrm>
+              <a:off x="3533681" y="1475400"/>
+              <a:ext cx="642620" cy="276225"/>
+            </a:xfrm>
+            <a:prstGeom prst="rect">
+              <a:avLst/>
+            </a:prstGeom>
+            <a:ln/>
+          </p:spPr>
+          <p:style>
+            <a:lnRef idx="1">
+              <a:schemeClr val="accent1"/>
+            </a:lnRef>
+            <a:fillRef idx="2">
+              <a:schemeClr val="accent1"/>
+            </a:fillRef>
+            <a:effectRef idx="1">
+              <a:schemeClr val="accent1"/>
+            </a:effectRef>
+            <a:fontRef idx="minor">
+              <a:schemeClr val="dk1"/>
+            </a:fontRef>
+          </p:style>
+          <p:txBody>
+            <a:bodyPr rot="0" spcFirstLastPara="0" vert="horz" wrap="none" lIns="91440" tIns="45720" rIns="91440" bIns="45720" numCol="1" spcCol="0" rtlCol="0" fromWordArt="0" anchor="t" anchorCtr="0" forceAA="0" compatLnSpc="1">
+              <a:prstTxWarp prst="textNoShape">
+                <a:avLst/>
+              </a:prstTxWarp>
+              <a:noAutofit/>
+            </a:bodyPr>
+            <a:lstStyle/>
+            <a:p>
+              <a:pPr>
+                <a:lnSpc>
+                  <a:spcPct val="115000"/>
+                </a:lnSpc>
+                <a:spcAft>
+                  <a:spcPts val="0"/>
+                </a:spcAft>
+              </a:pPr>
+              <a:r>
+                <a:rPr lang="en-NZ" sz="1200" b="1" dirty="0">
+                  <a:effectLst/>
+                  <a:latin typeface="Times New Roman"/>
+                  <a:ea typeface="SimSun"/>
+                </a:rPr>
+                <a:t>Update</a:t>
+              </a:r>
+            </a:p>
+          </p:txBody>
+        </p:sp>
+        <p:cxnSp>
+          <p:nvCxnSpPr>
+            <p:cNvPr id="8" name="Straight Arrow Connector 7"/>
+            <p:cNvCxnSpPr>
+              <a:stCxn id="4" idx="2"/>
+            </p:cNvCxnSpPr>
+            <p:nvPr/>
+          </p:nvCxnSpPr>
+          <p:spPr>
+            <a:xfrm flipH="1">
+              <a:off x="1414099" y="1057275"/>
+              <a:ext cx="2440893" cy="418926"/>
+            </a:xfrm>
+            <a:prstGeom prst="straightConnector1">
+              <a:avLst/>
+            </a:prstGeom>
+            <a:ln>
+              <a:tailEnd type="arrow"/>
+            </a:ln>
+          </p:spPr>
+          <p:style>
+            <a:lnRef idx="1">
+              <a:schemeClr val="accent1"/>
+            </a:lnRef>
+            <a:fillRef idx="0">
+              <a:schemeClr val="accent1"/>
+            </a:fillRef>
+            <a:effectRef idx="0">
+              <a:schemeClr val="accent1"/>
+            </a:effectRef>
+            <a:fontRef idx="minor">
+              <a:schemeClr val="tx1"/>
+            </a:fontRef>
+          </p:style>
+        </p:cxnSp>
+        <p:cxnSp>
+          <p:nvCxnSpPr>
+            <p:cNvPr id="10" name="Straight Arrow Connector 9"/>
+            <p:cNvCxnSpPr>
+              <a:stCxn id="4" idx="2"/>
+            </p:cNvCxnSpPr>
+            <p:nvPr/>
+          </p:nvCxnSpPr>
+          <p:spPr>
+            <a:xfrm>
+              <a:off x="3854992" y="1057275"/>
+              <a:ext cx="2391457" cy="436200"/>
+            </a:xfrm>
+            <a:prstGeom prst="straightConnector1">
+              <a:avLst/>
+            </a:prstGeom>
+            <a:ln>
+              <a:tailEnd type="arrow"/>
+            </a:ln>
+          </p:spPr>
+          <p:style>
+            <a:lnRef idx="1">
+              <a:schemeClr val="accent1"/>
+            </a:lnRef>
+            <a:fillRef idx="0">
+              <a:schemeClr val="accent1"/>
+            </a:fillRef>
+            <a:effectRef idx="0">
+              <a:schemeClr val="accent1"/>
+            </a:effectRef>
+            <a:fontRef idx="minor">
+              <a:schemeClr val="tx1"/>
+            </a:fontRef>
+          </p:style>
+        </p:cxnSp>
+        <p:cxnSp>
+          <p:nvCxnSpPr>
+            <p:cNvPr id="12" name="Straight Arrow Connector 11"/>
+            <p:cNvCxnSpPr/>
+            <p:nvPr/>
+          </p:nvCxnSpPr>
+          <p:spPr>
+            <a:xfrm>
+              <a:off x="1132499" y="1769700"/>
+              <a:ext cx="9525" cy="543899"/>
+            </a:xfrm>
+            <a:prstGeom prst="straightConnector1">
+              <a:avLst/>
+            </a:prstGeom>
+            <a:ln>
+              <a:tailEnd type="arrow"/>
+            </a:ln>
+          </p:spPr>
+          <p:style>
+            <a:lnRef idx="1">
+              <a:schemeClr val="accent1"/>
+            </a:lnRef>
+            <a:fillRef idx="0">
+              <a:schemeClr val="accent1"/>
+            </a:fillRef>
+            <a:effectRef idx="0">
+              <a:schemeClr val="accent1"/>
+            </a:effectRef>
+            <a:fontRef idx="minor">
+              <a:schemeClr val="tx1"/>
+            </a:fontRef>
+          </p:style>
+        </p:cxnSp>
+        <p:cxnSp>
+          <p:nvCxnSpPr>
+            <p:cNvPr id="14" name="Straight Arrow Connector 13"/>
+            <p:cNvCxnSpPr/>
+            <p:nvPr/>
+          </p:nvCxnSpPr>
+          <p:spPr>
+            <a:xfrm>
+              <a:off x="6533469" y="1778728"/>
+              <a:ext cx="9525" cy="543560"/>
+            </a:xfrm>
+            <a:prstGeom prst="straightConnector1">
+              <a:avLst/>
+            </a:prstGeom>
+            <a:ln>
+              <a:tailEnd type="arrow"/>
+            </a:ln>
+          </p:spPr>
+          <p:style>
+            <a:lnRef idx="1">
+              <a:schemeClr val="accent1"/>
+            </a:lnRef>
+            <a:fillRef idx="0">
+              <a:schemeClr val="accent1"/>
+            </a:fillRef>
+            <a:effectRef idx="0">
+              <a:schemeClr val="accent1"/>
+            </a:effectRef>
+            <a:fontRef idx="minor">
+              <a:schemeClr val="tx1"/>
+            </a:fontRef>
+          </p:style>
+        </p:cxnSp>
+        <p:cxnSp>
+          <p:nvCxnSpPr>
+            <p:cNvPr id="17" name="Straight Arrow Connector 16"/>
+            <p:cNvCxnSpPr>
+              <a:stCxn id="7" idx="2"/>
+              <a:endCxn id="2" idx="0"/>
+            </p:cNvCxnSpPr>
+            <p:nvPr/>
+          </p:nvCxnSpPr>
+          <p:spPr>
+            <a:xfrm flipH="1">
+              <a:off x="3026354" y="1751625"/>
+              <a:ext cx="828637" cy="540000"/>
+            </a:xfrm>
+            <a:prstGeom prst="straightConnector1">
+              <a:avLst/>
+            </a:prstGeom>
+            <a:ln>
+              <a:tailEnd type="arrow"/>
+            </a:ln>
+          </p:spPr>
+          <p:style>
+            <a:lnRef idx="1">
+              <a:schemeClr val="accent1"/>
+            </a:lnRef>
+            <a:fillRef idx="0">
+              <a:schemeClr val="accent1"/>
+            </a:fillRef>
+            <a:effectRef idx="0">
+              <a:schemeClr val="accent1"/>
+            </a:effectRef>
+            <a:fontRef idx="minor">
+              <a:schemeClr val="tx1"/>
+            </a:fontRef>
+          </p:style>
+        </p:cxnSp>
+        <p:cxnSp>
+          <p:nvCxnSpPr>
+            <p:cNvPr id="18" name="Straight Arrow Connector 17"/>
+            <p:cNvCxnSpPr>
+              <a:stCxn id="7" idx="2"/>
+              <a:endCxn id="19" idx="0"/>
+            </p:cNvCxnSpPr>
+            <p:nvPr/>
+          </p:nvCxnSpPr>
+          <p:spPr>
+            <a:xfrm>
+              <a:off x="3854991" y="1751625"/>
+              <a:ext cx="974505" cy="540000"/>
+            </a:xfrm>
+            <a:prstGeom prst="straightConnector1">
+              <a:avLst/>
+            </a:prstGeom>
+            <a:ln>
+              <a:tailEnd type="arrow"/>
+            </a:ln>
+          </p:spPr>
+          <p:style>
+            <a:lnRef idx="1">
+              <a:schemeClr val="accent1"/>
+            </a:lnRef>
+            <a:fillRef idx="0">
+              <a:schemeClr val="accent1"/>
+            </a:fillRef>
+            <a:effectRef idx="0">
+              <a:schemeClr val="accent1"/>
+            </a:effectRef>
+            <a:fontRef idx="minor">
+              <a:schemeClr val="tx1"/>
+            </a:fontRef>
+          </p:style>
+        </p:cxnSp>
+        <p:sp>
+          <p:nvSpPr>
+            <p:cNvPr id="2" name="Rectangle 1"/>
+            <p:cNvSpPr/>
+            <p:nvPr/>
+          </p:nvSpPr>
+          <p:spPr>
+            <a:xfrm>
+              <a:off x="2291359" y="2325042"/>
+              <a:ext cx="1469990" cy="838200"/>
+            </a:xfrm>
+            <a:prstGeom prst="rect">
+              <a:avLst/>
+            </a:prstGeom>
+          </p:spPr>
+          <p:style>
+            <a:lnRef idx="2">
+              <a:schemeClr val="accent1"/>
+            </a:lnRef>
+            <a:fillRef idx="1">
+              <a:schemeClr val="lt1"/>
+            </a:fillRef>
+            <a:effectRef idx="0">
+              <a:schemeClr val="accent1"/>
+            </a:effectRef>
+            <a:fontRef idx="minor">
+              <a:schemeClr val="dk1"/>
+            </a:fontRef>
+          </p:style>
+          <p:txBody>
+            <a:bodyPr rtlCol="0" anchor="ctr"/>
+            <a:lstStyle/>
+            <a:p>
+              <a:pPr algn="just"/>
+              <a:r>
+                <a:rPr lang="en-US" sz="1200" dirty="0" smtClean="0">
+                  <a:latin typeface="Times New Roman" pitchFamily="18" charset="0"/>
+                  <a:cs typeface="Times New Roman" pitchFamily="18" charset="0"/>
+                </a:rPr>
+                <a:t>Check updates of the foreign key in the referencing table.</a:t>
+              </a:r>
+              <a:endParaRPr lang="en-NZ" sz="1200" dirty="0">
+                <a:latin typeface="Times New Roman" pitchFamily="18" charset="0"/>
+                <a:cs typeface="Times New Roman" pitchFamily="18" charset="0"/>
+              </a:endParaRPr>
+            </a:p>
+          </p:txBody>
+        </p:sp>
+        <p:sp>
+          <p:nvSpPr>
+            <p:cNvPr id="19" name="Rectangle 18"/>
+            <p:cNvSpPr/>
+            <p:nvPr/>
+          </p:nvSpPr>
+          <p:spPr>
+            <a:xfrm>
+              <a:off x="4095096" y="2325042"/>
+              <a:ext cx="1468800" cy="838200"/>
+            </a:xfrm>
+            <a:prstGeom prst="rect">
+              <a:avLst/>
+            </a:prstGeom>
+          </p:spPr>
+          <p:style>
+            <a:lnRef idx="2">
+              <a:schemeClr val="accent1"/>
+            </a:lnRef>
+            <a:fillRef idx="1">
+              <a:schemeClr val="lt1"/>
+            </a:fillRef>
+            <a:effectRef idx="0">
+              <a:schemeClr val="accent1"/>
+            </a:effectRef>
+            <a:fontRef idx="minor">
+              <a:schemeClr val="dk1"/>
+            </a:fontRef>
+          </p:style>
+          <p:txBody>
+            <a:bodyPr rtlCol="0" anchor="ctr"/>
+            <a:lstStyle/>
+            <a:p>
+              <a:pPr algn="just"/>
+              <a:r>
+                <a:rPr lang="en-US" sz="1200" dirty="0" smtClean="0">
+                  <a:latin typeface="Times New Roman" pitchFamily="18" charset="0"/>
+                  <a:cs typeface="Times New Roman" pitchFamily="18" charset="0"/>
+                </a:rPr>
+                <a:t>Check updates of the primary key in the referenced table</a:t>
+              </a:r>
+              <a:endParaRPr lang="en-NZ" sz="1200" dirty="0">
+                <a:latin typeface="Times New Roman" pitchFamily="18" charset="0"/>
+                <a:cs typeface="Times New Roman" pitchFamily="18" charset="0"/>
+              </a:endParaRPr>
+            </a:p>
+          </p:txBody>
+        </p:sp>
+        <p:sp>
+          <p:nvSpPr>
+            <p:cNvPr id="20" name="Rectangle 19"/>
+            <p:cNvSpPr/>
+            <p:nvPr/>
+          </p:nvSpPr>
+          <p:spPr>
+            <a:xfrm>
+              <a:off x="5897644" y="2325042"/>
+              <a:ext cx="1468800" cy="838800"/>
+            </a:xfrm>
+            <a:prstGeom prst="rect">
+              <a:avLst/>
+            </a:prstGeom>
+          </p:spPr>
+          <p:style>
+            <a:lnRef idx="2">
+              <a:schemeClr val="accent1"/>
+            </a:lnRef>
+            <a:fillRef idx="1">
+              <a:schemeClr val="lt1"/>
+            </a:fillRef>
+            <a:effectRef idx="0">
+              <a:schemeClr val="accent1"/>
+            </a:effectRef>
+            <a:fontRef idx="minor">
+              <a:schemeClr val="dk1"/>
+            </a:fontRef>
+          </p:style>
+          <p:txBody>
+            <a:bodyPr rtlCol="0" anchor="ctr"/>
+            <a:lstStyle/>
+            <a:p>
+              <a:pPr algn="just"/>
+              <a:r>
+                <a:rPr lang="en-US" sz="1200" dirty="0" smtClean="0">
+                  <a:latin typeface="Times New Roman" pitchFamily="18" charset="0"/>
+                  <a:cs typeface="Times New Roman" pitchFamily="18" charset="0"/>
+                </a:rPr>
+                <a:t>Check deletions in the referenced table</a:t>
+              </a:r>
+              <a:endParaRPr lang="en-NZ" sz="1200" dirty="0">
+                <a:latin typeface="Times New Roman" pitchFamily="18" charset="0"/>
+                <a:cs typeface="Times New Roman" pitchFamily="18" charset="0"/>
+              </a:endParaRPr>
+            </a:p>
+          </p:txBody>
+        </p:sp>
+        <p:sp>
+          <p:nvSpPr>
+            <p:cNvPr id="21" name="Rectangle 20"/>
+            <p:cNvSpPr/>
+            <p:nvPr/>
+          </p:nvSpPr>
+          <p:spPr>
+            <a:xfrm>
+              <a:off x="488812" y="2325042"/>
+              <a:ext cx="1468800" cy="838800"/>
+            </a:xfrm>
+            <a:prstGeom prst="rect">
+              <a:avLst/>
+            </a:prstGeom>
+          </p:spPr>
+          <p:style>
+            <a:lnRef idx="2">
+              <a:schemeClr val="accent1"/>
+            </a:lnRef>
+            <a:fillRef idx="1">
+              <a:schemeClr val="lt1"/>
+            </a:fillRef>
+            <a:effectRef idx="0">
+              <a:schemeClr val="accent1"/>
+            </a:effectRef>
+            <a:fontRef idx="minor">
+              <a:schemeClr val="dk1"/>
+            </a:fontRef>
+          </p:style>
+          <p:txBody>
+            <a:bodyPr rtlCol="0" anchor="ctr"/>
+            <a:lstStyle/>
+            <a:p>
+              <a:pPr algn="just"/>
+              <a:r>
+                <a:rPr lang="en-US" sz="1200" dirty="0" smtClean="0">
+                  <a:latin typeface="Times New Roman" pitchFamily="18" charset="0"/>
+                  <a:cs typeface="Times New Roman" pitchFamily="18" charset="0"/>
+                </a:rPr>
+                <a:t>Check insertions in the refrencing table.</a:t>
+              </a:r>
+              <a:endParaRPr lang="en-NZ" sz="1200" dirty="0">
+                <a:latin typeface="Times New Roman" pitchFamily="18" charset="0"/>
+                <a:cs typeface="Times New Roman" pitchFamily="18" charset="0"/>
+              </a:endParaRPr>
+            </a:p>
+          </p:txBody>
+        </p:sp>
+        <p:cxnSp>
+          <p:nvCxnSpPr>
+            <p:cNvPr id="26" name="Straight Arrow Connector 25"/>
+            <p:cNvCxnSpPr/>
+            <p:nvPr/>
+          </p:nvCxnSpPr>
+          <p:spPr>
+            <a:xfrm>
+              <a:off x="3825854" y="1080201"/>
+              <a:ext cx="9525" cy="396000"/>
+            </a:xfrm>
+            <a:prstGeom prst="straightConnector1">
+              <a:avLst/>
+            </a:prstGeom>
+            <a:ln>
+              <a:tailEnd type="arrow"/>
+            </a:ln>
+          </p:spPr>
+          <p:style>
+            <a:lnRef idx="1">
+              <a:schemeClr val="accent1"/>
+            </a:lnRef>
+            <a:fillRef idx="0">
+              <a:schemeClr val="accent1"/>
+            </a:fillRef>
+            <a:effectRef idx="0">
+              <a:schemeClr val="accent1"/>
+            </a:effectRef>
+            <a:fontRef idx="minor">
+              <a:schemeClr val="tx1"/>
+            </a:fontRef>
+          </p:style>
+        </p:cxnSp>
+      </p:grpSp>
+    </p:spTree>
+    <p:extLst>
+      <p:ext uri="{BB962C8B-B14F-4D97-AF65-F5344CB8AC3E}">
+        <p14:creationId xmlns:p14="http://schemas.microsoft.com/office/powerpoint/2010/main" val="2519815158"/>
+      </p:ext>
+    </p:extLst>
+  </p:cSld>
+  <p:clrMapOvr>
+    <a:masterClrMapping/>
+  </p:clrMapOvr>
+</p:sld>
+</file>
+
 <file path=ppt/slides/slide2.xml><?xml version="1.0" encoding="utf-8"?>
 <p:sld xmlns:a="http://schemas.openxmlformats.org/drawingml/2006/main" xmlns:r="http://schemas.openxmlformats.org/officeDocument/2006/relationships" xmlns:p="http://schemas.openxmlformats.org/presentationml/2006/main">
   <p:cSld>

</xml_diff>